<commit_message>
[REL] Rebuild for v5.0.0
Signed-off-by: Jay Heng <hengjie1989@foxmail.com>
</commit_message>
<xml_diff>
--- a/img/RTyyyy_container/i.MX RT1180 image layout.pptx
+++ b/img/RTyyyy_container/i.MX RT1180 image layout.pptx
@@ -248,7 +248,7 @@
                   </a:schemeClr>
                 </a:solidFill>
               </a:rPr>
-              <a:t>5/18/2023 4:52:16 PM</a:t>
+              <a:t>5/23/2023 2:15:50 PM</a:t>
             </a:fld>
             <a:endParaRPr lang="en-US" sz="900" dirty="0">
               <a:solidFill>
@@ -1443,7 +1443,7 @@
                   </a:schemeClr>
                 </a:solidFill>
               </a:rPr>
-              <a:t>5/18/2023 4:52:16 PM</a:t>
+              <a:t>5/23/2023 2:15:49 PM</a:t>
             </a:fld>
             <a:endParaRPr lang="en-US" sz="900" dirty="0">
               <a:solidFill>
@@ -29315,7 +29315,7 @@
           <a:p>
             <a:fld id="{3BDFDD5F-E85B-4DA3-A4F9-9CF3C7409943}" type="datetime4">
               <a:rPr lang="en-US" smtClean="0"/>
-              <a:t>May 18, 2023</a:t>
+              <a:t>May 23, 2023</a:t>
             </a:fld>
             <a:endParaRPr lang="en-US" dirty="0"/>
           </a:p>
@@ -41578,6 +41578,324 @@
               <a:t>(SRK, Certs, Signatures, Blob)</a:t>
             </a:r>
             <a:endParaRPr lang="en-US" sz="1400" dirty="0"/>
+          </a:p>
+        </p:txBody>
+      </p:sp>
+      <p:grpSp>
+        <p:nvGrpSpPr>
+          <p:cNvPr id="2" name="Group 72">
+            <a:extLst>
+              <a:ext uri="{FF2B5EF4-FFF2-40B4-BE49-F238E27FC236}">
+                <a16:creationId xmlns:a16="http://schemas.microsoft.com/office/drawing/2014/main" id="{64AD510E-134D-CF19-2E0C-59776C369452}"/>
+              </a:ext>
+            </a:extLst>
+          </p:cNvPr>
+          <p:cNvGrpSpPr/>
+          <p:nvPr/>
+        </p:nvGrpSpPr>
+        <p:grpSpPr>
+          <a:xfrm>
+            <a:off x="7942461" y="578460"/>
+            <a:ext cx="2877185" cy="4989882"/>
+            <a:chOff x="-1039352" y="-84240"/>
+            <a:chExt cx="2877185" cy="4584065"/>
+          </a:xfrm>
+        </p:grpSpPr>
+        <p:cxnSp>
+          <p:nvCxnSpPr>
+            <p:cNvPr id="3" name="Straight Connector 17">
+              <a:extLst>
+                <a:ext uri="{FF2B5EF4-FFF2-40B4-BE49-F238E27FC236}">
+                  <a16:creationId xmlns:a16="http://schemas.microsoft.com/office/drawing/2014/main" id="{5294057B-1FE4-AA63-2776-31E32219FB7B}"/>
+                </a:ext>
+              </a:extLst>
+            </p:cNvPr>
+            <p:cNvCxnSpPr/>
+            <p:nvPr/>
+          </p:nvCxnSpPr>
+          <p:spPr>
+            <a:xfrm rot="5400000" flipH="1" flipV="1">
+              <a:off x="-1036714" y="2136842"/>
+              <a:ext cx="0" cy="0"/>
+            </a:xfrm>
+            <a:prstGeom prst="line">
+              <a:avLst/>
+            </a:prstGeom>
+          </p:spPr>
+          <p:style>
+            <a:lnRef idx="1">
+              <a:schemeClr val="accent1"/>
+            </a:lnRef>
+            <a:fillRef idx="0">
+              <a:schemeClr val="accent1"/>
+            </a:fillRef>
+            <a:effectRef idx="0">
+              <a:schemeClr val="accent1"/>
+            </a:effectRef>
+            <a:fontRef idx="minor">
+              <a:schemeClr val="tx1"/>
+            </a:fontRef>
+          </p:style>
+        </p:cxnSp>
+        <p:sp>
+          <p:nvSpPr>
+            <p:cNvPr id="4" name="Rectangle 18">
+              <a:extLst>
+                <a:ext uri="{FF2B5EF4-FFF2-40B4-BE49-F238E27FC236}">
+                  <a16:creationId xmlns:a16="http://schemas.microsoft.com/office/drawing/2014/main" id="{8586B585-473A-11A1-A6BB-F8946E0B5DA6}"/>
+                </a:ext>
+              </a:extLst>
+            </p:cNvPr>
+            <p:cNvSpPr/>
+            <p:nvPr/>
+          </p:nvSpPr>
+          <p:spPr>
+            <a:xfrm>
+              <a:off x="-1039352" y="-84240"/>
+              <a:ext cx="2877185" cy="4584065"/>
+            </a:xfrm>
+            <a:prstGeom prst="rect">
+              <a:avLst/>
+            </a:prstGeom>
+            <a:noFill/>
+            <a:ln>
+              <a:solidFill>
+                <a:schemeClr val="tx1"/>
+              </a:solidFill>
+            </a:ln>
+          </p:spPr>
+          <p:style>
+            <a:lnRef idx="2">
+              <a:schemeClr val="accent1">
+                <a:shade val="50000"/>
+              </a:schemeClr>
+            </a:lnRef>
+            <a:fillRef idx="1">
+              <a:schemeClr val="accent1"/>
+            </a:fillRef>
+            <a:effectRef idx="0">
+              <a:schemeClr val="accent1"/>
+            </a:effectRef>
+            <a:fontRef idx="minor">
+              <a:schemeClr val="lt1"/>
+            </a:fontRef>
+          </p:style>
+          <p:txBody>
+            <a:bodyPr rtlCol="0" anchor="ctr"/>
+            <a:lstStyle/>
+            <a:p>
+              <a:pPr algn="ctr"/>
+              <a:endParaRPr lang="en-US" dirty="0"/>
+            </a:p>
+          </p:txBody>
+        </p:sp>
+      </p:grpSp>
+      <p:sp>
+        <p:nvSpPr>
+          <p:cNvPr id="14" name="TextBox 63">
+            <a:extLst>
+              <a:ext uri="{FF2B5EF4-FFF2-40B4-BE49-F238E27FC236}">
+                <a16:creationId xmlns:a16="http://schemas.microsoft.com/office/drawing/2014/main" id="{7E7B9633-A67B-12BD-28C5-DC98D9D44C98}"/>
+              </a:ext>
+            </a:extLst>
+          </p:cNvPr>
+          <p:cNvSpPr txBox="1"/>
+          <p:nvPr/>
+        </p:nvSpPr>
+        <p:spPr>
+          <a:xfrm>
+            <a:off x="7948811" y="559474"/>
+            <a:ext cx="2870835" cy="523220"/>
+          </a:xfrm>
+          <a:prstGeom prst="rect">
+            <a:avLst/>
+          </a:prstGeom>
+          <a:solidFill>
+            <a:srgbClr val="C19F32"/>
+          </a:solidFill>
+          <a:ln w="19050">
+            <a:solidFill>
+              <a:schemeClr val="tx1"/>
+            </a:solidFill>
+          </a:ln>
+        </p:spPr>
+        <p:txBody>
+          <a:bodyPr wrap="square" rtlCol="0">
+            <a:spAutoFit/>
+          </a:bodyPr>
+          <a:lstStyle/>
+          <a:p>
+            <a:pPr algn="ctr"/>
+            <a:r>
+              <a:rPr lang="en-US" altLang="zh-CN" sz="1400" dirty="0"/>
+              <a:t>Main Boot Record (MBR)</a:t>
+            </a:r>
+            <a:endParaRPr lang="en-US" sz="1400" dirty="0">
+              <a:sym typeface="+mn-ea"/>
+            </a:endParaRPr>
+          </a:p>
+          <a:p>
+            <a:pPr algn="ctr"/>
+            <a:r>
+              <a:rPr lang="en-US" altLang="zh-CN" sz="1400" dirty="0"/>
+              <a:t>Disk Partition Table (DPT)</a:t>
+            </a:r>
+            <a:endParaRPr lang="en-US" sz="1400" dirty="0"/>
+          </a:p>
+        </p:txBody>
+      </p:sp>
+      <p:sp>
+        <p:nvSpPr>
+          <p:cNvPr id="15" name="TextBox 63">
+            <a:extLst>
+              <a:ext uri="{FF2B5EF4-FFF2-40B4-BE49-F238E27FC236}">
+                <a16:creationId xmlns:a16="http://schemas.microsoft.com/office/drawing/2014/main" id="{178E12B4-BEF2-89F8-A8F7-2494EAC17416}"/>
+              </a:ext>
+            </a:extLst>
+          </p:cNvPr>
+          <p:cNvSpPr txBox="1"/>
+          <p:nvPr/>
+        </p:nvSpPr>
+        <p:spPr>
+          <a:xfrm>
+            <a:off x="7951987" y="1574657"/>
+            <a:ext cx="2870835" cy="307777"/>
+          </a:xfrm>
+          <a:prstGeom prst="rect">
+            <a:avLst/>
+          </a:prstGeom>
+          <a:solidFill>
+            <a:srgbClr val="FF0000"/>
+          </a:solidFill>
+          <a:ln w="19050">
+            <a:solidFill>
+              <a:schemeClr val="tx1"/>
+            </a:solidFill>
+          </a:ln>
+        </p:spPr>
+        <p:txBody>
+          <a:bodyPr wrap="square" rtlCol="0">
+            <a:spAutoFit/>
+          </a:bodyPr>
+          <a:lstStyle/>
+          <a:p>
+            <a:pPr algn="ctr"/>
+            <a:r>
+              <a:rPr lang="en-US" altLang="zh-CN" sz="1400" b="0" i="0" u="none" strike="noStrike" baseline="0" dirty="0">
+                <a:solidFill>
+                  <a:srgbClr val="3C3C3C"/>
+                </a:solidFill>
+                <a:cs typeface="Arial" panose="020B0604020202020204" pitchFamily="34" charset="0"/>
+              </a:rPr>
+              <a:t>Container Header</a:t>
+            </a:r>
+            <a:endParaRPr lang="en-US" sz="1400" dirty="0">
+              <a:cs typeface="Arial" panose="020B0604020202020204" pitchFamily="34" charset="0"/>
+            </a:endParaRPr>
+          </a:p>
+        </p:txBody>
+      </p:sp>
+      <p:sp>
+        <p:nvSpPr>
+          <p:cNvPr id="16" name="TextBox 63">
+            <a:extLst>
+              <a:ext uri="{FF2B5EF4-FFF2-40B4-BE49-F238E27FC236}">
+                <a16:creationId xmlns:a16="http://schemas.microsoft.com/office/drawing/2014/main" id="{4D39E2F3-572E-EB0A-BAF9-307036C4459F}"/>
+              </a:ext>
+            </a:extLst>
+          </p:cNvPr>
+          <p:cNvSpPr txBox="1"/>
+          <p:nvPr/>
+        </p:nvSpPr>
+        <p:spPr>
+          <a:xfrm>
+            <a:off x="7951987" y="1882434"/>
+            <a:ext cx="2870835" cy="306705"/>
+          </a:xfrm>
+          <a:prstGeom prst="rect">
+            <a:avLst/>
+          </a:prstGeom>
+          <a:solidFill>
+            <a:srgbClr val="00B050"/>
+          </a:solidFill>
+          <a:ln w="19050">
+            <a:solidFill>
+              <a:schemeClr val="tx1"/>
+            </a:solidFill>
+          </a:ln>
+        </p:spPr>
+        <p:txBody>
+          <a:bodyPr wrap="square" rtlCol="0">
+            <a:spAutoFit/>
+          </a:bodyPr>
+          <a:lstStyle/>
+          <a:p>
+            <a:pPr algn="ctr"/>
+            <a:r>
+              <a:rPr lang="en-US" sz="1400" dirty="0">
+                <a:sym typeface="+mn-ea"/>
+              </a:rPr>
+              <a:t>Image Array Entry(s)</a:t>
+            </a:r>
+            <a:endParaRPr lang="en-US" sz="1400" dirty="0"/>
+          </a:p>
+        </p:txBody>
+      </p:sp>
+      <p:sp>
+        <p:nvSpPr>
+          <p:cNvPr id="20" name="TextBox 63">
+            <a:extLst>
+              <a:ext uri="{FF2B5EF4-FFF2-40B4-BE49-F238E27FC236}">
+                <a16:creationId xmlns:a16="http://schemas.microsoft.com/office/drawing/2014/main" id="{01FF7CC1-DE1C-BDA7-04FA-7BBBDD863DDE}"/>
+              </a:ext>
+            </a:extLst>
+          </p:cNvPr>
+          <p:cNvSpPr txBox="1"/>
+          <p:nvPr/>
+        </p:nvSpPr>
+        <p:spPr>
+          <a:xfrm>
+            <a:off x="7948811" y="3123781"/>
+            <a:ext cx="2870835" cy="738664"/>
+          </a:xfrm>
+          <a:prstGeom prst="rect">
+            <a:avLst/>
+          </a:prstGeom>
+          <a:solidFill>
+            <a:srgbClr val="0070C0"/>
+          </a:solidFill>
+          <a:ln w="19050">
+            <a:solidFill>
+              <a:schemeClr val="tx1"/>
+            </a:solidFill>
+          </a:ln>
+        </p:spPr>
+        <p:txBody>
+          <a:bodyPr wrap="square" rtlCol="0">
+            <a:spAutoFit/>
+          </a:bodyPr>
+          <a:lstStyle/>
+          <a:p>
+            <a:pPr algn="ctr"/>
+            <a:r>
+              <a:rPr lang="en-US" sz="1400" dirty="0">
+                <a:sym typeface="+mn-ea"/>
+              </a:rPr>
+              <a:t>Application Image(s)</a:t>
+            </a:r>
+          </a:p>
+          <a:p>
+            <a:pPr algn="ctr"/>
+            <a:endParaRPr lang="en-US" sz="1400" dirty="0">
+              <a:sym typeface="+mn-ea"/>
+            </a:endParaRPr>
+          </a:p>
+          <a:p>
+            <a:pPr algn="ctr"/>
+            <a:r>
+              <a:rPr lang="en-US" sz="1400" dirty="0"/>
+              <a:t>Plaintext</a:t>
+            </a:r>
           </a:p>
         </p:txBody>
       </p:sp>

</xml_diff>